<commit_message>
- Updating documentation after review
</commit_message>
<xml_diff>
--- a/Documentation/Developer_Test.pptx
+++ b/Documentation/Developer_Test.pptx
@@ -16,6 +16,7 @@
     <p:sldId id="276" r:id="rId10"/>
     <p:sldId id="275" r:id="rId11"/>
     <p:sldId id="278" r:id="rId12"/>
+    <p:sldId id="279" r:id="rId13"/>
   </p:sldIdLst>
   <p:sldSz cx="12192000" cy="6858000"/>
   <p:notesSz cx="6858000" cy="9144000"/>
@@ -12586,9 +12587,9 @@
         <p:grpSpPr>
           <a:xfrm>
             <a:off x="1504287" y="2295525"/>
-            <a:ext cx="2438400" cy="4832092"/>
+            <a:ext cx="3156490" cy="4985980"/>
             <a:chOff x="1246834" y="2295525"/>
-            <a:chExt cx="2438400" cy="4832092"/>
+            <a:chExt cx="2438400" cy="4985980"/>
           </a:xfrm>
         </p:grpSpPr>
         <p:sp>
@@ -12642,7 +12643,7 @@
           <p:spPr>
             <a:xfrm>
               <a:off x="1246834" y="2664857"/>
-              <a:ext cx="2438400" cy="4462760"/>
+              <a:ext cx="2438400" cy="4616648"/>
             </a:xfrm>
             <a:prstGeom prst="rect">
               <a:avLst/>
@@ -12843,6 +12844,58 @@
                 <a:buChar char="•"/>
               </a:pPr>
               <a:r>
+                <a:rPr lang="es-MX" sz="1200" dirty="0">
+                  <a:latin typeface="Calibri" panose="020F0502020204030204" pitchFamily="34" charset="0"/>
+                  <a:cs typeface="Calibri" panose="020F0502020204030204" pitchFamily="34" charset="0"/>
+                </a:rPr>
+                <a:t>Use ADC </a:t>
+              </a:r>
+              <a:r>
+                <a:rPr lang="es-MX" sz="1200" dirty="0" err="1">
+                  <a:latin typeface="Calibri" panose="020F0502020204030204" pitchFamily="34" charset="0"/>
+                  <a:cs typeface="Calibri" panose="020F0502020204030204" pitchFamily="34" charset="0"/>
+                </a:rPr>
+                <a:t>supply</a:t>
+              </a:r>
+              <a:r>
+                <a:rPr lang="es-MX" sz="1200" dirty="0">
+                  <a:latin typeface="Calibri" panose="020F0502020204030204" pitchFamily="34" charset="0"/>
+                  <a:cs typeface="Calibri" panose="020F0502020204030204" pitchFamily="34" charset="0"/>
+                </a:rPr>
+                <a:t> </a:t>
+              </a:r>
+              <a:r>
+                <a:rPr lang="es-MX" sz="1200" dirty="0" err="1">
+                  <a:latin typeface="Calibri" panose="020F0502020204030204" pitchFamily="34" charset="0"/>
+                  <a:cs typeface="Calibri" panose="020F0502020204030204" pitchFamily="34" charset="0"/>
+                </a:rPr>
+                <a:t>voltage</a:t>
+              </a:r>
+              <a:r>
+                <a:rPr lang="es-MX" sz="1200" dirty="0">
+                  <a:latin typeface="Calibri" panose="020F0502020204030204" pitchFamily="34" charset="0"/>
+                  <a:cs typeface="Calibri" panose="020F0502020204030204" pitchFamily="34" charset="0"/>
+                </a:rPr>
+                <a:t> as </a:t>
+              </a:r>
+              <a:r>
+                <a:rPr lang="es-MX" sz="1200" dirty="0" err="1">
+                  <a:latin typeface="Calibri" panose="020F0502020204030204" pitchFamily="34" charset="0"/>
+                  <a:cs typeface="Calibri" panose="020F0502020204030204" pitchFamily="34" charset="0"/>
+                </a:rPr>
+                <a:t>reference</a:t>
+              </a:r>
+              <a:endParaRPr lang="es-MX" sz="1200" dirty="0">
+                <a:latin typeface="Calibri" panose="020F0502020204030204" pitchFamily="34" charset="0"/>
+                <a:cs typeface="Calibri" panose="020F0502020204030204" pitchFamily="34" charset="0"/>
+              </a:endParaRPr>
+            </a:p>
+            <a:p>
+              <a:pPr marL="628650" lvl="1" indent="-171450">
+                <a:buFont typeface="Arial" panose="020B0604020202020204" pitchFamily="34" charset="0"/>
+                <a:buChar char="•"/>
+              </a:pPr>
+              <a:r>
                 <a:rPr lang="es-MX" sz="1200" dirty="0" err="1">
                   <a:latin typeface="Calibri" panose="020F0502020204030204" pitchFamily="34" charset="0"/>
                   <a:cs typeface="Calibri" panose="020F0502020204030204" pitchFamily="34" charset="0"/>
@@ -13009,9 +13062,9 @@
         <p:grpSpPr>
           <a:xfrm>
             <a:off x="6654814" y="2295525"/>
-            <a:ext cx="3776448" cy="4801315"/>
+            <a:ext cx="4317986" cy="5170646"/>
             <a:chOff x="5305408" y="2295525"/>
-            <a:chExt cx="2808781" cy="4801315"/>
+            <a:chExt cx="2808781" cy="5170646"/>
           </a:xfrm>
         </p:grpSpPr>
         <p:sp>
@@ -13065,7 +13118,7 @@
           <p:spPr>
             <a:xfrm>
               <a:off x="5305408" y="2664857"/>
-              <a:ext cx="2808781" cy="4431983"/>
+              <a:ext cx="2808781" cy="4801314"/>
             </a:xfrm>
             <a:prstGeom prst="rect">
               <a:avLst/>
@@ -13205,6 +13258,103 @@
                 <a:latin typeface="Calibri" panose="020F0502020204030204" pitchFamily="34" charset="0"/>
                 <a:cs typeface="Calibri" panose="020F0502020204030204" pitchFamily="34" charset="0"/>
               </a:endParaRPr>
+            </a:p>
+            <a:p>
+              <a:pPr marL="628650" lvl="1" indent="-171450">
+                <a:buFont typeface="Arial" panose="020B0604020202020204" pitchFamily="34" charset="0"/>
+                <a:buChar char="•"/>
+              </a:pPr>
+              <a:r>
+                <a:rPr lang="es-MX" sz="1200" dirty="0">
+                  <a:latin typeface="Calibri" panose="020F0502020204030204" pitchFamily="34" charset="0"/>
+                  <a:cs typeface="Calibri" panose="020F0502020204030204" pitchFamily="34" charset="0"/>
+                </a:rPr>
+                <a:t>Use IPG </a:t>
+              </a:r>
+              <a:r>
+                <a:rPr lang="es-MX" sz="1200" dirty="0" err="1">
+                  <a:latin typeface="Calibri" panose="020F0502020204030204" pitchFamily="34" charset="0"/>
+                  <a:cs typeface="Calibri" panose="020F0502020204030204" pitchFamily="34" charset="0"/>
+                </a:rPr>
+                <a:t>Clock</a:t>
+              </a:r>
+              <a:r>
+                <a:rPr lang="es-MX" sz="1200" dirty="0">
+                  <a:latin typeface="Calibri" panose="020F0502020204030204" pitchFamily="34" charset="0"/>
+                  <a:cs typeface="Calibri" panose="020F0502020204030204" pitchFamily="34" charset="0"/>
+                </a:rPr>
+                <a:t> </a:t>
+              </a:r>
+              <a:r>
+                <a:rPr lang="es-MX" sz="1200" dirty="0" err="1">
+                  <a:latin typeface="Calibri" panose="020F0502020204030204" pitchFamily="34" charset="0"/>
+                  <a:cs typeface="Calibri" panose="020F0502020204030204" pitchFamily="34" charset="0"/>
+                </a:rPr>
+                <a:t>divided</a:t>
+              </a:r>
+              <a:r>
+                <a:rPr lang="es-MX" sz="1200" dirty="0">
+                  <a:latin typeface="Calibri" panose="020F0502020204030204" pitchFamily="34" charset="0"/>
+                  <a:cs typeface="Calibri" panose="020F0502020204030204" pitchFamily="34" charset="0"/>
+                </a:rPr>
+                <a:t> </a:t>
+              </a:r>
+              <a:r>
+                <a:rPr lang="es-MX" sz="1200" dirty="0" err="1">
+                  <a:latin typeface="Calibri" panose="020F0502020204030204" pitchFamily="34" charset="0"/>
+                  <a:cs typeface="Calibri" panose="020F0502020204030204" pitchFamily="34" charset="0"/>
+                </a:rPr>
+                <a:t>by</a:t>
+              </a:r>
+              <a:r>
+                <a:rPr lang="es-MX" sz="1200" dirty="0">
+                  <a:latin typeface="Calibri" panose="020F0502020204030204" pitchFamily="34" charset="0"/>
+                  <a:cs typeface="Calibri" panose="020F0502020204030204" pitchFamily="34" charset="0"/>
+                </a:rPr>
+                <a:t> 2 (</a:t>
+              </a:r>
+              <a:r>
+                <a:rPr lang="es-MX" sz="1200" dirty="0" err="1">
+                  <a:latin typeface="Calibri" panose="020F0502020204030204" pitchFamily="34" charset="0"/>
+                  <a:cs typeface="Calibri" panose="020F0502020204030204" pitchFamily="34" charset="0"/>
+                </a:rPr>
+                <a:t>Other</a:t>
+              </a:r>
+              <a:r>
+                <a:rPr lang="es-MX" sz="1200" dirty="0">
+                  <a:latin typeface="Calibri" panose="020F0502020204030204" pitchFamily="34" charset="0"/>
+                  <a:cs typeface="Calibri" panose="020F0502020204030204" pitchFamily="34" charset="0"/>
+                </a:rPr>
+                <a:t> </a:t>
+              </a:r>
+              <a:r>
+                <a:rPr lang="es-MX" sz="1200" dirty="0" err="1">
+                  <a:latin typeface="Calibri" panose="020F0502020204030204" pitchFamily="34" charset="0"/>
+                  <a:cs typeface="Calibri" panose="020F0502020204030204" pitchFamily="34" charset="0"/>
+                </a:rPr>
+                <a:t>clock</a:t>
+              </a:r>
+              <a:r>
+                <a:rPr lang="es-MX" sz="1200" dirty="0">
+                  <a:latin typeface="Calibri" panose="020F0502020204030204" pitchFamily="34" charset="0"/>
+                  <a:cs typeface="Calibri" panose="020F0502020204030204" pitchFamily="34" charset="0"/>
+                </a:rPr>
+                <a:t> </a:t>
+              </a:r>
+              <a:r>
+                <a:rPr lang="es-MX" sz="1200" dirty="0" err="1">
+                  <a:latin typeface="Calibri" panose="020F0502020204030204" pitchFamily="34" charset="0"/>
+                  <a:cs typeface="Calibri" panose="020F0502020204030204" pitchFamily="34" charset="0"/>
+                </a:rPr>
+                <a:t>for</a:t>
+              </a:r>
+              <a:r>
+                <a:rPr lang="es-MX" sz="1200" dirty="0">
+                  <a:latin typeface="Calibri" panose="020F0502020204030204" pitchFamily="34" charset="0"/>
+                  <a:cs typeface="Calibri" panose="020F0502020204030204" pitchFamily="34" charset="0"/>
+                </a:rPr>
+                <a:t> ADC)</a:t>
+              </a:r>
             </a:p>
             <a:p>
               <a:pPr marL="628650" lvl="1" indent="-171450">
@@ -13526,7 +13676,7 @@
             </a:pPr>
             <a:r>
               <a:rPr lang="es-MX" dirty="0"/>
-              <a:t>Descargar una copia local del repositorio (IDE sugerido: </a:t>
+              <a:t>Descargar una copia local del repositorio (Herramienta sugerida de control de versiones: </a:t>
             </a:r>
             <a:r>
               <a:rPr lang="es-MX" dirty="0" err="1"/>
@@ -13549,6 +13699,24 @@
               <a:t>main.c</a:t>
             </a:r>
             <a:endParaRPr lang="es-MX" dirty="0"/>
+          </a:p>
+          <a:p>
+            <a:pPr>
+              <a:buFont typeface="+mj-lt"/>
+              <a:buAutoNum type="arabicPeriod"/>
+            </a:pPr>
+            <a:r>
+              <a:rPr lang="es-MX" dirty="0"/>
+              <a:t>Hacer el </a:t>
+            </a:r>
+            <a:r>
+              <a:rPr lang="es-MX" dirty="0" err="1"/>
+              <a:t>setup</a:t>
+            </a:r>
+            <a:r>
+              <a:rPr lang="es-MX" dirty="0"/>
+              <a:t> para cada tarjeta y cargar un proyecto de ejemplo.</a:t>
+            </a:r>
           </a:p>
           <a:p>
             <a:pPr>
@@ -13598,6 +13766,227 @@
     <p:extLst>
       <p:ext uri="{BB962C8B-B14F-4D97-AF65-F5344CB8AC3E}">
         <p14:creationId xmlns:p14="http://schemas.microsoft.com/office/powerpoint/2010/main" val="1732786221"/>
+      </p:ext>
+    </p:extLst>
+  </p:cSld>
+  <p:clrMapOvr>
+    <a:masterClrMapping/>
+  </p:clrMapOvr>
+</p:sld>
+</file>
+
+<file path=ppt/slides/slide12.xml><?xml version="1.0" encoding="utf-8"?>
+<p:sld xmlns:a="http://schemas.openxmlformats.org/drawingml/2006/main" xmlns:r="http://schemas.openxmlformats.org/officeDocument/2006/relationships" xmlns:p="http://schemas.openxmlformats.org/presentationml/2006/main">
+  <p:cSld>
+    <p:spTree>
+      <p:nvGrpSpPr>
+        <p:cNvPr id="1" name=""/>
+        <p:cNvGrpSpPr/>
+        <p:nvPr/>
+      </p:nvGrpSpPr>
+      <p:grpSpPr>
+        <a:xfrm>
+          <a:off x="0" y="0"/>
+          <a:ext cx="0" cy="0"/>
+          <a:chOff x="0" y="0"/>
+          <a:chExt cx="0" cy="0"/>
+        </a:xfrm>
+      </p:grpSpPr>
+      <p:sp>
+        <p:nvSpPr>
+          <p:cNvPr id="2" name="Title 1">
+            <a:extLst>
+              <a:ext uri="{FF2B5EF4-FFF2-40B4-BE49-F238E27FC236}">
+                <a16:creationId xmlns:a16="http://schemas.microsoft.com/office/drawing/2014/main" id="{20271F49-E5CA-4C69-B2DD-F398EF952B95}"/>
+              </a:ext>
+            </a:extLst>
+          </p:cNvPr>
+          <p:cNvSpPr>
+            <a:spLocks noGrp="1"/>
+          </p:cNvSpPr>
+          <p:nvPr>
+            <p:ph type="title"/>
+          </p:nvPr>
+        </p:nvSpPr>
+        <p:spPr/>
+        <p:txBody>
+          <a:bodyPr/>
+          <a:lstStyle/>
+          <a:p>
+            <a:r>
+              <a:rPr lang="es-MX" dirty="0"/>
+              <a:t>Documentación</a:t>
+            </a:r>
+            <a:endParaRPr lang="en-US" dirty="0"/>
+          </a:p>
+        </p:txBody>
+      </p:sp>
+      <p:sp>
+        <p:nvSpPr>
+          <p:cNvPr id="3" name="Content Placeholder 2">
+            <a:extLst>
+              <a:ext uri="{FF2B5EF4-FFF2-40B4-BE49-F238E27FC236}">
+                <a16:creationId xmlns:a16="http://schemas.microsoft.com/office/drawing/2014/main" id="{C76E2DA7-081F-43A3-810D-2A18B3F2EB64}"/>
+              </a:ext>
+            </a:extLst>
+          </p:cNvPr>
+          <p:cNvSpPr>
+            <a:spLocks noGrp="1"/>
+          </p:cNvSpPr>
+          <p:nvPr>
+            <p:ph idx="1"/>
+          </p:nvPr>
+        </p:nvSpPr>
+        <p:spPr>
+          <a:xfrm>
+            <a:off x="1154954" y="2532478"/>
+            <a:ext cx="9178654" cy="4001486"/>
+          </a:xfrm>
+        </p:spPr>
+        <p:txBody>
+          <a:bodyPr>
+            <a:normAutofit/>
+          </a:bodyPr>
+          <a:lstStyle/>
+          <a:p>
+            <a:pPr marL="0" indent="0">
+              <a:buNone/>
+            </a:pPr>
+            <a:r>
+              <a:rPr lang="es-MX" dirty="0"/>
+              <a:t>El repositorio tiene una carpeta de documentación, la cual contiene:</a:t>
+            </a:r>
+          </a:p>
+          <a:p>
+            <a:pPr lvl="1"/>
+            <a:r>
+              <a:rPr lang="es-MX" dirty="0"/>
+              <a:t>Documentación de </a:t>
+            </a:r>
+            <a:r>
+              <a:rPr lang="es-MX" dirty="0" err="1"/>
+              <a:t>Doxygen</a:t>
+            </a:r>
+            <a:r>
+              <a:rPr lang="es-MX" dirty="0"/>
+              <a:t> para los archivos del </a:t>
+            </a:r>
+            <a:r>
+              <a:rPr lang="es-MX" dirty="0" err="1"/>
+              <a:t>framework</a:t>
+            </a:r>
+            <a:r>
+              <a:rPr lang="es-MX" dirty="0"/>
+              <a:t> (Elemento Estático y </a:t>
+            </a:r>
+            <a:r>
+              <a:rPr lang="es-MX" dirty="0" err="1"/>
+              <a:t>Wrappers</a:t>
+            </a:r>
+            <a:r>
+              <a:rPr lang="es-MX" dirty="0"/>
+              <a:t>).</a:t>
+            </a:r>
+          </a:p>
+          <a:p>
+            <a:pPr lvl="1"/>
+            <a:r>
+              <a:rPr lang="es-MX" dirty="0"/>
+              <a:t>Manual de referencia del RT1064 </a:t>
+            </a:r>
+          </a:p>
+          <a:p>
+            <a:pPr lvl="1"/>
+            <a:r>
+              <a:rPr lang="es-MX" dirty="0"/>
+              <a:t>Guía de la tarjeta RT1064 EVK.</a:t>
+            </a:r>
+          </a:p>
+          <a:p>
+            <a:pPr lvl="1"/>
+            <a:r>
+              <a:rPr lang="es-MX" dirty="0"/>
+              <a:t>Esquemático de RT1064 EVK.</a:t>
+            </a:r>
+          </a:p>
+          <a:p>
+            <a:pPr lvl="1"/>
+            <a:r>
+              <a:rPr lang="es-MX" dirty="0"/>
+              <a:t>Driver para COM Virtual del RT1064 EVK (mbedWinSerial_16466.exe)</a:t>
+            </a:r>
+          </a:p>
+          <a:p>
+            <a:pPr lvl="1"/>
+            <a:r>
+              <a:rPr lang="es-MX" dirty="0"/>
+              <a:t>Manual de Referencia del ATMEGA4809</a:t>
+            </a:r>
+          </a:p>
+          <a:p>
+            <a:pPr lvl="1"/>
+            <a:r>
+              <a:rPr lang="es-MX" dirty="0"/>
+              <a:t>Guía de la tarjeta ATMEGA4809 </a:t>
+            </a:r>
+            <a:r>
+              <a:rPr lang="es-MX" dirty="0" err="1"/>
+              <a:t>Xplained</a:t>
+            </a:r>
+            <a:r>
+              <a:rPr lang="es-MX" dirty="0"/>
+              <a:t> Pro.</a:t>
+            </a:r>
+          </a:p>
+          <a:p>
+            <a:pPr lvl="1"/>
+            <a:r>
+              <a:rPr lang="es-MX" dirty="0"/>
+              <a:t>Guía de uso del auto generador y el </a:t>
+            </a:r>
+            <a:r>
+              <a:rPr lang="es-MX" dirty="0" err="1"/>
+              <a:t>framework</a:t>
+            </a:r>
+            <a:endParaRPr lang="es-MX" dirty="0"/>
+          </a:p>
+          <a:p>
+            <a:pPr lvl="1"/>
+            <a:r>
+              <a:rPr lang="en-US" dirty="0" err="1"/>
+              <a:t>Documento</a:t>
+            </a:r>
+            <a:r>
+              <a:rPr lang="en-US" dirty="0"/>
+              <a:t> para </a:t>
+            </a:r>
+            <a:r>
+              <a:rPr lang="en-US" dirty="0" err="1"/>
+              <a:t>capturar</a:t>
+            </a:r>
+            <a:r>
+              <a:rPr lang="en-US" dirty="0"/>
+              <a:t> feedback (</a:t>
+            </a:r>
+            <a:r>
+              <a:rPr lang="es-MX" dirty="0" err="1"/>
+              <a:t>Feedback</a:t>
+            </a:r>
+            <a:r>
+              <a:rPr lang="es-MX" dirty="0"/>
+              <a:t>_ Developers.docx)</a:t>
+            </a:r>
+          </a:p>
+          <a:p>
+            <a:pPr lvl="1"/>
+            <a:endParaRPr lang="en-US" dirty="0"/>
+          </a:p>
+        </p:txBody>
+      </p:sp>
+    </p:spTree>
+    <p:extLst>
+      <p:ext uri="{BB962C8B-B14F-4D97-AF65-F5344CB8AC3E}">
+        <p14:creationId xmlns:p14="http://schemas.microsoft.com/office/powerpoint/2010/main" val="1631446978"/>
       </p:ext>
     </p:extLst>
   </p:cSld>
@@ -15325,7 +15714,7 @@
           <a:lstStyle/>
           <a:p>
             <a:r>
-              <a:rPr lang="es-MX">
+              <a:rPr lang="es-MX" dirty="0">
                 <a:solidFill>
                   <a:schemeClr val="bg1"/>
                 </a:solidFill>
@@ -15337,7 +15726,7 @@
             <a:pPr marL="0" indent="0">
               <a:buNone/>
             </a:pPr>
-            <a:endParaRPr lang="es-MX">
+            <a:endParaRPr lang="es-MX" dirty="0">
               <a:solidFill>
                 <a:schemeClr val="bg1"/>
               </a:solidFill>
@@ -15345,7 +15734,7 @@
           </a:p>
           <a:p>
             <a:r>
-              <a:rPr lang="es-MX" i="1">
+              <a:rPr lang="es-MX" i="1" dirty="0">
                 <a:solidFill>
                   <a:schemeClr val="bg1"/>
                 </a:solidFill>
@@ -15353,15 +15742,31 @@
               <a:t>Framework</a:t>
             </a:r>
             <a:r>
-              <a:rPr lang="es-MX">
+              <a:rPr lang="es-MX" dirty="0">
                 <a:solidFill>
                   <a:schemeClr val="bg1"/>
                 </a:solidFill>
               </a:rPr>
-              <a:t>: es una herramienta que permite el reuso de arquitecturas y componentes de </a:t>
-            </a:r>
-            <a:r>
-              <a:rPr lang="es-MX" i="1">
+              <a:t>: es una herramienta que permite el </a:t>
+            </a:r>
+            <a:r>
+              <a:rPr lang="es-MX" dirty="0" err="1">
+                <a:solidFill>
+                  <a:schemeClr val="bg1"/>
+                </a:solidFill>
+              </a:rPr>
+              <a:t>reuso</a:t>
+            </a:r>
+            <a:r>
+              <a:rPr lang="es-MX" dirty="0">
+                <a:solidFill>
+                  <a:schemeClr val="bg1"/>
+                </a:solidFill>
+              </a:rPr>
+              <a:t> de arquitecturas y componentes de </a:t>
+            </a:r>
+            <a:r>
+              <a:rPr lang="es-MX" i="1" dirty="0">
                 <a:solidFill>
                   <a:schemeClr val="bg1"/>
                 </a:solidFill>
@@ -15370,28 +15775,28 @@
             </a:r>
           </a:p>
           <a:p>
-            <a:endParaRPr lang="es-MX">
+            <a:endParaRPr lang="es-MX" dirty="0">
               <a:solidFill>
                 <a:schemeClr val="bg1"/>
               </a:solidFill>
             </a:endParaRPr>
           </a:p>
           <a:p>
-            <a:endParaRPr lang="es-MX">
+            <a:endParaRPr lang="es-MX" dirty="0">
               <a:solidFill>
                 <a:schemeClr val="bg1"/>
               </a:solidFill>
             </a:endParaRPr>
           </a:p>
           <a:p>
-            <a:endParaRPr lang="es-MX">
+            <a:endParaRPr lang="es-MX" dirty="0">
               <a:solidFill>
                 <a:schemeClr val="bg1"/>
               </a:solidFill>
             </a:endParaRPr>
           </a:p>
           <a:p>
-            <a:endParaRPr lang="en-US">
+            <a:endParaRPr lang="en-US" dirty="0">
               <a:solidFill>
                 <a:schemeClr val="bg1"/>
               </a:solidFill>
@@ -17608,13 +18013,13 @@
         </p:nvSpPr>
         <p:spPr>
           <a:xfrm>
-            <a:off x="1048422" y="2479212"/>
-            <a:ext cx="6027081" cy="3930466"/>
+            <a:off x="1048422" y="2479211"/>
+            <a:ext cx="6080744" cy="4099141"/>
           </a:xfrm>
         </p:spPr>
         <p:txBody>
           <a:bodyPr>
-            <a:normAutofit/>
+            <a:normAutofit lnSpcReduction="10000"/>
           </a:bodyPr>
           <a:lstStyle/>
           <a:p>
@@ -17670,6 +18075,15 @@
               <a:t>framework</a:t>
             </a:r>
             <a:endParaRPr lang="es-MX" dirty="0"/>
+          </a:p>
+          <a:p>
+            <a:pPr marL="457200" lvl="1" indent="0">
+              <a:buNone/>
+            </a:pPr>
+            <a:r>
+              <a:rPr lang="es-MX" dirty="0"/>
+              <a:t>Desarrollar las aplicaciones siguiendo el orden anterior.</a:t>
+            </a:r>
           </a:p>
           <a:p>
             <a:r>

</xml_diff>